<commit_message>
Presentation last sec update
</commit_message>
<xml_diff>
--- a/BRI4KA.pptx
+++ b/BRI4KA.pptx
@@ -248,7 +248,7 @@
             <a:fld id="{EFC10EE1-B198-C942-8235-326C972CBB30}" type="datetimeFigureOut">
               <a:rPr lang="en-US" smtClean="0"/>
               <a:pPr/>
-              <a:t>7/6/2019</a:t>
+              <a:t>7/7/2019</a:t>
             </a:fld>
             <a:endParaRPr lang="en-US" dirty="0"/>
           </a:p>
@@ -2639,14 +2639,14 @@
           </a:ln>
           <a:extLst>
             <a:ext uri="{909E8E84-426E-40dd-AFC4-6F175D3DCCD1}">
-              <a14:hiddenFill xmlns:a14="http://schemas.microsoft.com/office/drawing/2010/main" xmlns="">
+              <a14:hiddenFill xmlns="" xmlns:a14="http://schemas.microsoft.com/office/drawing/2010/main">
                 <a:solidFill>
                   <a:srgbClr val="FFFFFF"/>
                 </a:solidFill>
               </a14:hiddenFill>
             </a:ext>
             <a:ext uri="{91240B29-F687-4f45-9708-019B960494DF}">
-              <a14:hiddenLine xmlns:a14="http://schemas.microsoft.com/office/drawing/2010/main" xmlns="" w="12700">
+              <a14:hiddenLine xmlns="" xmlns:a14="http://schemas.microsoft.com/office/drawing/2010/main" w="12700">
                 <a:solidFill>
                   <a:schemeClr val="tx1"/>
                 </a:solidFill>
@@ -2945,17 +2945,6 @@
               </a:rPr>
               <a:t>BRI4KA</a:t>
             </a:r>
-            <a:endParaRPr lang="en-US" sz="2300" spc="600" dirty="0">
-              <a:solidFill>
-                <a:schemeClr val="tx1">
-                  <a:lumMod val="20000"/>
-                  <a:lumOff val="80000"/>
-                </a:schemeClr>
-              </a:solidFill>
-              <a:latin typeface="Montserrat" charset="0"/>
-              <a:ea typeface="Montserrat" charset="0"/>
-              <a:cs typeface="Montserrat" charset="0"/>
-            </a:endParaRPr>
           </a:p>
         </p:txBody>
       </p:sp>
@@ -2967,8 +2956,8 @@
         </p:nvSpPr>
         <p:spPr>
           <a:xfrm>
-            <a:off x="1656096" y="3375271"/>
-            <a:ext cx="1665712" cy="400110"/>
+            <a:off x="1656096" y="3313717"/>
+            <a:ext cx="2261260" cy="523220"/>
           </a:xfrm>
           <a:prstGeom prst="rect">
             <a:avLst/>
@@ -2982,7 +2971,7 @@
           <a:lstStyle/>
           <a:p>
             <a:r>
-              <a:rPr lang="bg-BG" sz="2000" b="1" dirty="0" smtClean="0">
+              <a:rPr lang="bg-BG" sz="2800" b="1" dirty="0" smtClean="0">
                 <a:solidFill>
                   <a:schemeClr val="tx2"/>
                 </a:solidFill>
@@ -2992,7 +2981,7 @@
               </a:rPr>
               <a:t>За авторите</a:t>
             </a:r>
-            <a:endParaRPr lang="en-US" sz="2000" b="1" dirty="0">
+            <a:endParaRPr lang="en-US" sz="2800" b="1" dirty="0">
               <a:solidFill>
                 <a:schemeClr val="tx2"/>
               </a:solidFill>
@@ -3199,7 +3188,7 @@
               </a:lnSpc>
             </a:pPr>
             <a:r>
-              <a:rPr lang="en-US" sz="1700" dirty="0" smtClean="0">
+              <a:rPr lang="en-US" sz="2000" dirty="0">
                 <a:solidFill>
                   <a:schemeClr val="tx1"/>
                 </a:solidFill>
@@ -3207,10 +3196,32 @@
                 <a:ea typeface="Source Sans Pro" charset="0"/>
                 <a:cs typeface="Source Sans Pro" charset="0"/>
               </a:rPr>
-              <a:t>“BRICHKA” </a:t>
+              <a:t>“</a:t>
             </a:r>
             <a:r>
-              <a:rPr lang="bg-BG" sz="1700" dirty="0" smtClean="0">
+              <a:rPr lang="en-US" sz="2000" dirty="0">
+                <a:solidFill>
+                  <a:schemeClr val="tx1"/>
+                </a:solidFill>
+                <a:latin typeface="Source Sans Pro" charset="0"/>
+                <a:ea typeface="Source Sans Pro" charset="0"/>
+                <a:cs typeface="Source Sans Pro" charset="0"/>
+              </a:rPr>
+              <a:t>BRICHKA</a:t>
+            </a:r>
+            <a:r>
+              <a:rPr lang="en-US" sz="2000" dirty="0">
+                <a:solidFill>
+                  <a:schemeClr val="tx1"/>
+                </a:solidFill>
+                <a:latin typeface="Source Sans Pro" charset="0"/>
+                <a:ea typeface="Source Sans Pro" charset="0"/>
+                <a:cs typeface="Source Sans Pro" charset="0"/>
+              </a:rPr>
+              <a:t>” </a:t>
+            </a:r>
+            <a:r>
+              <a:rPr lang="bg-BG" sz="2000" dirty="0">
                 <a:solidFill>
                   <a:schemeClr val="tx1"/>
                 </a:solidFill>
@@ -3221,7 +3232,7 @@
               <a:t>представлява</a:t>
             </a:r>
             <a:r>
-              <a:rPr lang="en-US" sz="1700" dirty="0" smtClean="0">
+              <a:rPr lang="en-US" sz="2000" dirty="0">
                 <a:solidFill>
                   <a:schemeClr val="tx1"/>
                 </a:solidFill>
@@ -3232,7 +3243,7 @@
               <a:t> </a:t>
             </a:r>
             <a:r>
-              <a:rPr lang="bg-BG" sz="1700" dirty="0" smtClean="0">
+              <a:rPr lang="bg-BG" sz="2000" dirty="0">
                 <a:solidFill>
                   <a:schemeClr val="tx1"/>
                 </a:solidFill>
@@ -3243,7 +3254,7 @@
               <a:t>малък пластмасов танк, който се управлява</a:t>
             </a:r>
             <a:r>
-              <a:rPr lang="en-US" sz="1700" dirty="0" smtClean="0">
+              <a:rPr lang="en-US" sz="2000" dirty="0">
                 <a:solidFill>
                   <a:schemeClr val="tx1"/>
                 </a:solidFill>
@@ -3254,7 +3265,7 @@
               <a:t>, </a:t>
             </a:r>
             <a:r>
-              <a:rPr lang="bg-BG" sz="1700" dirty="0" smtClean="0">
+              <a:rPr lang="bg-BG" sz="2000" dirty="0">
                 <a:solidFill>
                   <a:schemeClr val="tx1"/>
                 </a:solidFill>
@@ -3265,7 +3276,7 @@
               <a:t> дава информация за някои физични величини в пространството</a:t>
             </a:r>
             <a:r>
-              <a:rPr lang="en-US" sz="1700" dirty="0" smtClean="0">
+              <a:rPr lang="en-US" sz="2000" dirty="0">
                 <a:solidFill>
                   <a:schemeClr val="tx1"/>
                 </a:solidFill>
@@ -3276,7 +3287,7 @@
               <a:t> </a:t>
             </a:r>
             <a:r>
-              <a:rPr lang="bg-BG" sz="1700" dirty="0" smtClean="0">
+              <a:rPr lang="bg-BG" sz="2000" dirty="0">
                 <a:solidFill>
                   <a:schemeClr val="tx1"/>
                 </a:solidFill>
@@ -3286,7 +3297,7 @@
               </a:rPr>
               <a:t>и извършва дадени действия, чрез приемане и предаване на радио сигнали. </a:t>
             </a:r>
-            <a:endParaRPr lang="en-US" sz="1700" dirty="0">
+            <a:endParaRPr lang="en-US" sz="2000" dirty="0">
               <a:solidFill>
                 <a:schemeClr val="tx1"/>
               </a:solidFill>
@@ -3493,7 +3504,7 @@
               </a:lnSpc>
             </a:pPr>
             <a:r>
-              <a:rPr lang="bg-BG" sz="1700" dirty="0" smtClean="0">
+              <a:rPr lang="bg-BG" sz="2000" dirty="0" smtClean="0">
                 <a:solidFill>
                   <a:schemeClr val="tx1"/>
                 </a:solidFill>
@@ -3504,7 +3515,7 @@
               <a:t>Ние- авторите сме ученици участващи в националната програма </a:t>
             </a:r>
             <a:r>
-              <a:rPr lang="bg-BG" sz="1700" dirty="0">
+              <a:rPr lang="bg-BG" sz="2000" dirty="0">
                 <a:solidFill>
                   <a:schemeClr val="tx1"/>
                 </a:solidFill>
@@ -3515,7 +3526,7 @@
               <a:t> "Обучение за ИТ </a:t>
             </a:r>
             <a:r>
-              <a:rPr lang="bg-BG" sz="1700" dirty="0" smtClean="0">
+              <a:rPr lang="bg-BG" sz="2000" dirty="0" smtClean="0">
                 <a:solidFill>
                   <a:schemeClr val="tx1"/>
                 </a:solidFill>
@@ -3523,10 +3534,32 @@
                 <a:ea typeface="Source Sans Pro" charset="0"/>
                 <a:cs typeface="Source Sans Pro" charset="0"/>
               </a:rPr>
-              <a:t>кариера„. Съвместните ни усилия, непрекъснатата работа и безсънните нощи (за някои от нас) направиха възможно пускането на проекта </a:t>
+              <a:t>кариера„. Съвместните ни усилия, непрекъснатата работа и безсънните </a:t>
             </a:r>
             <a:r>
-              <a:rPr lang="en-US" sz="1700" dirty="0" smtClean="0">
+              <a:rPr lang="bg-BG" sz="2000" dirty="0">
+                <a:solidFill>
+                  <a:schemeClr val="tx1"/>
+                </a:solidFill>
+                <a:latin typeface="Source Sans Pro" charset="0"/>
+                <a:ea typeface="Source Sans Pro" charset="0"/>
+                <a:cs typeface="Source Sans Pro" charset="0"/>
+              </a:rPr>
+              <a:t>нощи</a:t>
+            </a:r>
+            <a:r>
+              <a:rPr lang="bg-BG" sz="2000" dirty="0" smtClean="0">
+                <a:solidFill>
+                  <a:schemeClr val="tx1"/>
+                </a:solidFill>
+                <a:latin typeface="Source Sans Pro" charset="0"/>
+                <a:ea typeface="Source Sans Pro" charset="0"/>
+                <a:cs typeface="Source Sans Pro" charset="0"/>
+              </a:rPr>
+              <a:t> (за някои от нас) направиха възможно пускането на проекта </a:t>
+            </a:r>
+            <a:r>
+              <a:rPr lang="en-US" sz="2000" dirty="0" smtClean="0">
                 <a:solidFill>
                   <a:schemeClr val="tx1"/>
                 </a:solidFill>
@@ -3537,7 +3570,7 @@
               <a:t>“BRICHKA”</a:t>
             </a:r>
             <a:r>
-              <a:rPr lang="bg-BG" sz="1700" dirty="0" smtClean="0">
+              <a:rPr lang="bg-BG" sz="2000" dirty="0" smtClean="0">
                 <a:solidFill>
                   <a:schemeClr val="tx1"/>
                 </a:solidFill>
@@ -3547,7 +3580,7 @@
               </a:rPr>
               <a:t>.</a:t>
             </a:r>
-            <a:endParaRPr lang="bg-BG" sz="1700" dirty="0">
+            <a:endParaRPr lang="bg-BG" sz="2000" dirty="0">
               <a:solidFill>
                 <a:schemeClr val="tx1"/>
               </a:solidFill>
@@ -3562,7 +3595,7 @@
                 <a:spcPts val="2650"/>
               </a:lnSpc>
             </a:pPr>
-            <a:endParaRPr lang="en-US" sz="1700" dirty="0">
+            <a:endParaRPr lang="en-US" sz="2000" dirty="0">
               <a:solidFill>
                 <a:schemeClr val="tx1"/>
               </a:solidFill>
@@ -3581,8 +3614,8 @@
         </p:nvSpPr>
         <p:spPr>
           <a:xfrm>
-            <a:off x="12111124" y="3375271"/>
-            <a:ext cx="1544012" cy="400110"/>
+            <a:off x="12111124" y="3313716"/>
+            <a:ext cx="2060179" cy="523220"/>
           </a:xfrm>
           <a:prstGeom prst="rect">
             <a:avLst/>
@@ -3596,7 +3629,7 @@
           <a:lstStyle/>
           <a:p>
             <a:r>
-              <a:rPr lang="bg-BG" sz="2000" b="1" dirty="0" smtClean="0">
+              <a:rPr lang="bg-BG" sz="2800" b="1" dirty="0">
                 <a:solidFill>
                   <a:schemeClr val="tx2"/>
                 </a:solidFill>
@@ -3604,9 +3637,31 @@
                 <a:ea typeface="Montserrat" charset="0"/>
                 <a:cs typeface="Montserrat" charset="0"/>
               </a:rPr>
-              <a:t>За проекта</a:t>
+              <a:t>За</a:t>
             </a:r>
-            <a:endParaRPr lang="en-US" sz="2000" b="1" dirty="0">
+            <a:r>
+              <a:rPr lang="bg-BG" sz="2000" b="1" dirty="0" smtClean="0">
+                <a:solidFill>
+                  <a:schemeClr val="tx2"/>
+                </a:solidFill>
+                <a:latin typeface="Montserrat" charset="0"/>
+                <a:ea typeface="Montserrat" charset="0"/>
+                <a:cs typeface="Montserrat" charset="0"/>
+              </a:rPr>
+              <a:t> </a:t>
+            </a:r>
+            <a:r>
+              <a:rPr lang="bg-BG" sz="2800" b="1" dirty="0">
+                <a:solidFill>
+                  <a:schemeClr val="tx2"/>
+                </a:solidFill>
+                <a:latin typeface="Montserrat" charset="0"/>
+                <a:ea typeface="Montserrat" charset="0"/>
+                <a:cs typeface="Montserrat" charset="0"/>
+              </a:rPr>
+              <a:t>проекта</a:t>
+            </a:r>
+            <a:endParaRPr lang="en-US" sz="2800" b="1" dirty="0">
               <a:solidFill>
                 <a:schemeClr val="tx2"/>
               </a:solidFill>
@@ -6382,17 +6437,6 @@
               </a:rPr>
               <a:t>BRI4KA</a:t>
             </a:r>
-            <a:endParaRPr lang="en-US" sz="2300" spc="600" dirty="0">
-              <a:solidFill>
-                <a:schemeClr val="tx1">
-                  <a:lumMod val="20000"/>
-                  <a:lumOff val="80000"/>
-                </a:schemeClr>
-              </a:solidFill>
-              <a:latin typeface="Montserrat" charset="0"/>
-              <a:ea typeface="Montserrat" charset="0"/>
-              <a:cs typeface="Montserrat" charset="0"/>
-            </a:endParaRPr>
           </a:p>
         </p:txBody>
       </p:sp>
@@ -6522,7 +6566,7 @@
         </p:nvSpPr>
         <p:spPr>
           <a:xfrm>
-            <a:off x="7916281" y="5934456"/>
+            <a:off x="7916280" y="2725742"/>
             <a:ext cx="8594340" cy="2141612"/>
           </a:xfrm>
           <a:prstGeom prst="rect">
@@ -6574,6 +6618,240 @@
           </a:p>
         </p:txBody>
       </p:sp>
+      <p:sp>
+        <p:nvSpPr>
+          <p:cNvPr id="3" name="Subtitle 2"/>
+          <p:cNvSpPr txBox="1">
+            <a:spLocks/>
+          </p:cNvSpPr>
+          <p:nvPr/>
+        </p:nvSpPr>
+        <p:spPr>
+          <a:xfrm>
+            <a:off x="3503033" y="9980703"/>
+            <a:ext cx="17420833" cy="572724"/>
+          </a:xfrm>
+          <a:prstGeom prst="rect">
+            <a:avLst/>
+          </a:prstGeom>
+        </p:spPr>
+        <p:txBody>
+          <a:bodyPr vert="horz" wrap="square" lIns="217490" tIns="108745" rIns="217490" bIns="108745" rtlCol="0">
+            <a:spAutoFit/>
+          </a:bodyPr>
+          <a:lstStyle>
+            <a:lvl1pPr marL="0" indent="0" algn="ctr" defTabSz="1087636" rtl="0" eaLnBrk="1" latinLnBrk="0" hangingPunct="1">
+              <a:lnSpc>
+                <a:spcPct val="120000"/>
+              </a:lnSpc>
+              <a:spcBef>
+                <a:spcPct val="20000"/>
+              </a:spcBef>
+              <a:buFont typeface="Arial"/>
+              <a:buNone/>
+              <a:defRPr sz="2400" kern="1200">
+                <a:solidFill>
+                  <a:schemeClr val="tx2"/>
+                </a:solidFill>
+                <a:latin typeface="Open Sans Light"/>
+                <a:ea typeface="+mn-ea"/>
+                <a:cs typeface="Open Sans Light"/>
+              </a:defRPr>
+            </a:lvl1pPr>
+            <a:lvl2pPr marL="1087636" indent="0" algn="ctr" defTabSz="1087636" rtl="0" eaLnBrk="1" latinLnBrk="0" hangingPunct="1">
+              <a:lnSpc>
+                <a:spcPct val="130000"/>
+              </a:lnSpc>
+              <a:spcBef>
+                <a:spcPct val="20000"/>
+              </a:spcBef>
+              <a:buFont typeface="Arial"/>
+              <a:buNone/>
+              <a:defRPr sz="3200" kern="1200">
+                <a:solidFill>
+                  <a:schemeClr val="tx1">
+                    <a:tint val="75000"/>
+                  </a:schemeClr>
+                </a:solidFill>
+                <a:latin typeface="Open Sans"/>
+                <a:ea typeface="+mn-ea"/>
+                <a:cs typeface="Open Sans"/>
+              </a:defRPr>
+            </a:lvl2pPr>
+            <a:lvl3pPr marL="2175271" indent="0" algn="ctr" defTabSz="1087636" rtl="0" eaLnBrk="1" latinLnBrk="0" hangingPunct="1">
+              <a:lnSpc>
+                <a:spcPct val="130000"/>
+              </a:lnSpc>
+              <a:spcBef>
+                <a:spcPct val="20000"/>
+              </a:spcBef>
+              <a:buFont typeface="Arial"/>
+              <a:buNone/>
+              <a:defRPr sz="3200" kern="1200">
+                <a:solidFill>
+                  <a:schemeClr val="tx1">
+                    <a:tint val="75000"/>
+                  </a:schemeClr>
+                </a:solidFill>
+                <a:latin typeface="Open Sans"/>
+                <a:ea typeface="+mn-ea"/>
+                <a:cs typeface="Open Sans"/>
+              </a:defRPr>
+            </a:lvl3pPr>
+            <a:lvl4pPr marL="3262912" indent="0" algn="ctr" defTabSz="1087636" rtl="0" eaLnBrk="1" latinLnBrk="0" hangingPunct="1">
+              <a:lnSpc>
+                <a:spcPct val="130000"/>
+              </a:lnSpc>
+              <a:spcBef>
+                <a:spcPct val="20000"/>
+              </a:spcBef>
+              <a:buFont typeface="Arial"/>
+              <a:buNone/>
+              <a:defRPr sz="3200" kern="1200">
+                <a:solidFill>
+                  <a:schemeClr val="tx1">
+                    <a:tint val="75000"/>
+                  </a:schemeClr>
+                </a:solidFill>
+                <a:latin typeface="Open Sans"/>
+                <a:ea typeface="+mn-ea"/>
+                <a:cs typeface="Open Sans"/>
+              </a:defRPr>
+            </a:lvl4pPr>
+            <a:lvl5pPr marL="4350546" indent="0" algn="ctr" defTabSz="1087636" rtl="0" eaLnBrk="1" latinLnBrk="0" hangingPunct="1">
+              <a:lnSpc>
+                <a:spcPct val="130000"/>
+              </a:lnSpc>
+              <a:spcBef>
+                <a:spcPct val="20000"/>
+              </a:spcBef>
+              <a:buFont typeface="Arial"/>
+              <a:buNone/>
+              <a:defRPr sz="3200" kern="1200">
+                <a:solidFill>
+                  <a:schemeClr val="tx1">
+                    <a:tint val="75000"/>
+                  </a:schemeClr>
+                </a:solidFill>
+                <a:latin typeface="Open Sans"/>
+                <a:ea typeface="+mn-ea"/>
+                <a:cs typeface="Open Sans"/>
+              </a:defRPr>
+            </a:lvl5pPr>
+            <a:lvl6pPr marL="5438184" indent="0" algn="ctr" defTabSz="1087636" rtl="0" eaLnBrk="1" latinLnBrk="0" hangingPunct="1">
+              <a:spcBef>
+                <a:spcPct val="20000"/>
+              </a:spcBef>
+              <a:buFont typeface="Arial"/>
+              <a:buNone/>
+              <a:defRPr sz="4800" kern="1200">
+                <a:solidFill>
+                  <a:schemeClr val="tx1">
+                    <a:tint val="75000"/>
+                  </a:schemeClr>
+                </a:solidFill>
+                <a:latin typeface="+mn-lt"/>
+                <a:ea typeface="+mn-ea"/>
+                <a:cs typeface="+mn-cs"/>
+              </a:defRPr>
+            </a:lvl6pPr>
+            <a:lvl7pPr marL="6525820" indent="0" algn="ctr" defTabSz="1087636" rtl="0" eaLnBrk="1" latinLnBrk="0" hangingPunct="1">
+              <a:spcBef>
+                <a:spcPct val="20000"/>
+              </a:spcBef>
+              <a:buFont typeface="Arial"/>
+              <a:buNone/>
+              <a:defRPr sz="4800" kern="1200">
+                <a:solidFill>
+                  <a:schemeClr val="tx1">
+                    <a:tint val="75000"/>
+                  </a:schemeClr>
+                </a:solidFill>
+                <a:latin typeface="+mn-lt"/>
+                <a:ea typeface="+mn-ea"/>
+                <a:cs typeface="+mn-cs"/>
+              </a:defRPr>
+            </a:lvl7pPr>
+            <a:lvl8pPr marL="7613455" indent="0" algn="ctr" defTabSz="1087636" rtl="0" eaLnBrk="1" latinLnBrk="0" hangingPunct="1">
+              <a:spcBef>
+                <a:spcPct val="20000"/>
+              </a:spcBef>
+              <a:buFont typeface="Arial"/>
+              <a:buNone/>
+              <a:defRPr sz="4800" kern="1200">
+                <a:solidFill>
+                  <a:schemeClr val="tx1">
+                    <a:tint val="75000"/>
+                  </a:schemeClr>
+                </a:solidFill>
+                <a:latin typeface="+mn-lt"/>
+                <a:ea typeface="+mn-ea"/>
+                <a:cs typeface="+mn-cs"/>
+              </a:defRPr>
+            </a:lvl8pPr>
+            <a:lvl9pPr marL="8701091" indent="0" algn="ctr" defTabSz="1087636" rtl="0" eaLnBrk="1" latinLnBrk="0" hangingPunct="1">
+              <a:spcBef>
+                <a:spcPct val="20000"/>
+              </a:spcBef>
+              <a:buFont typeface="Arial"/>
+              <a:buNone/>
+              <a:defRPr sz="4800" kern="1200">
+                <a:solidFill>
+                  <a:schemeClr val="tx1">
+                    <a:tint val="75000"/>
+                  </a:schemeClr>
+                </a:solidFill>
+                <a:latin typeface="+mn-lt"/>
+                <a:ea typeface="+mn-ea"/>
+                <a:cs typeface="+mn-cs"/>
+              </a:defRPr>
+            </a:lvl9pPr>
+          </a:lstStyle>
+          <a:p>
+            <a:pPr>
+              <a:lnSpc>
+                <a:spcPts val="2650"/>
+              </a:lnSpc>
+            </a:pPr>
+            <a:r>
+              <a:rPr lang="en-US" sz="3200" dirty="0"/>
+              <a:t>https://github.com/BorislavValov/BRI4KA</a:t>
+            </a:r>
+            <a:endParaRPr lang="en-US" sz="3200" dirty="0">
+              <a:solidFill>
+                <a:schemeClr val="tx1"/>
+              </a:solidFill>
+              <a:latin typeface="Source Sans Pro" charset="0"/>
+              <a:ea typeface="Source Sans Pro" charset="0"/>
+              <a:cs typeface="Source Sans Pro" charset="0"/>
+            </a:endParaRPr>
+          </a:p>
+        </p:txBody>
+      </p:sp>
+      <p:pic>
+        <p:nvPicPr>
+          <p:cNvPr id="2" name="Picture 1"/>
+          <p:cNvPicPr>
+            <a:picLocks noChangeAspect="1"/>
+          </p:cNvPicPr>
+          <p:nvPr/>
+        </p:nvPicPr>
+        <p:blipFill>
+          <a:blip r:embed="rId3"/>
+          <a:stretch>
+            <a:fillRect/>
+          </a:stretch>
+        </p:blipFill>
+        <p:spPr>
+          <a:xfrm>
+            <a:off x="10501302" y="5735175"/>
+            <a:ext cx="3424296" cy="3377707"/>
+          </a:xfrm>
+          <a:prstGeom prst="rect">
+            <a:avLst/>
+          </a:prstGeom>
+        </p:spPr>
+      </p:pic>
     </p:spTree>
     <p:extLst>
       <p:ext uri="{BB962C8B-B14F-4D97-AF65-F5344CB8AC3E}">

</xml_diff>